<commit_message>
Update dev guide until 3.1
</commit_message>
<xml_diff>
--- a/docs/diagrams/LogicComponentSequenceDiagram.pptx
+++ b/docs/diagrams/LogicComponentSequenceDiagram.pptx
@@ -208,7 +208,7 @@
           <a:p>
             <a:fld id="{F5CC4B3F-88C1-4FFA-B1B6-F41C21DC6924}" type="datetimeFigureOut">
               <a:rPr lang="en-US" smtClean="0"/>
-              <a:t>2/6/2017</a:t>
+              <a:t>3/19/17</a:t>
             </a:fld>
             <a:endParaRPr lang="en-US"/>
           </a:p>
@@ -657,7 +657,7 @@
           <a:p>
             <a:fld id="{78C97017-6FC3-485B-9764-EAC9E56C1D49}" type="datetimeFigureOut">
               <a:rPr lang="en-US" smtClean="0"/>
-              <a:t>2/6/2017</a:t>
+              <a:t>3/19/17</a:t>
             </a:fld>
             <a:endParaRPr lang="en-US"/>
           </a:p>
@@ -827,7 +827,7 @@
           <a:p>
             <a:fld id="{78C97017-6FC3-485B-9764-EAC9E56C1D49}" type="datetimeFigureOut">
               <a:rPr lang="en-US" smtClean="0"/>
-              <a:t>2/6/2017</a:t>
+              <a:t>3/19/17</a:t>
             </a:fld>
             <a:endParaRPr lang="en-US"/>
           </a:p>
@@ -1007,7 +1007,7 @@
           <a:p>
             <a:fld id="{78C97017-6FC3-485B-9764-EAC9E56C1D49}" type="datetimeFigureOut">
               <a:rPr lang="en-US" smtClean="0"/>
-              <a:t>2/6/2017</a:t>
+              <a:t>3/19/17</a:t>
             </a:fld>
             <a:endParaRPr lang="en-US"/>
           </a:p>
@@ -1177,7 +1177,7 @@
           <a:p>
             <a:fld id="{78C97017-6FC3-485B-9764-EAC9E56C1D49}" type="datetimeFigureOut">
               <a:rPr lang="en-US" smtClean="0"/>
-              <a:t>2/6/2017</a:t>
+              <a:t>3/19/17</a:t>
             </a:fld>
             <a:endParaRPr lang="en-US"/>
           </a:p>
@@ -1423,7 +1423,7 @@
           <a:p>
             <a:fld id="{78C97017-6FC3-485B-9764-EAC9E56C1D49}" type="datetimeFigureOut">
               <a:rPr lang="en-US" smtClean="0"/>
-              <a:t>2/6/2017</a:t>
+              <a:t>3/19/17</a:t>
             </a:fld>
             <a:endParaRPr lang="en-US"/>
           </a:p>
@@ -1711,7 +1711,7 @@
           <a:p>
             <a:fld id="{78C97017-6FC3-485B-9764-EAC9E56C1D49}" type="datetimeFigureOut">
               <a:rPr lang="en-US" smtClean="0"/>
-              <a:t>2/6/2017</a:t>
+              <a:t>3/19/17</a:t>
             </a:fld>
             <a:endParaRPr lang="en-US"/>
           </a:p>
@@ -2133,7 +2133,7 @@
           <a:p>
             <a:fld id="{78C97017-6FC3-485B-9764-EAC9E56C1D49}" type="datetimeFigureOut">
               <a:rPr lang="en-US" smtClean="0"/>
-              <a:t>2/6/2017</a:t>
+              <a:t>3/19/17</a:t>
             </a:fld>
             <a:endParaRPr lang="en-US"/>
           </a:p>
@@ -2251,7 +2251,7 @@
           <a:p>
             <a:fld id="{78C97017-6FC3-485B-9764-EAC9E56C1D49}" type="datetimeFigureOut">
               <a:rPr lang="en-US" smtClean="0"/>
-              <a:t>2/6/2017</a:t>
+              <a:t>3/19/17</a:t>
             </a:fld>
             <a:endParaRPr lang="en-US"/>
           </a:p>
@@ -2346,7 +2346,7 @@
           <a:p>
             <a:fld id="{78C97017-6FC3-485B-9764-EAC9E56C1D49}" type="datetimeFigureOut">
               <a:rPr lang="en-US" smtClean="0"/>
-              <a:t>2/6/2017</a:t>
+              <a:t>3/19/17</a:t>
             </a:fld>
             <a:endParaRPr lang="en-US"/>
           </a:p>
@@ -2623,7 +2623,7 @@
           <a:p>
             <a:fld id="{78C97017-6FC3-485B-9764-EAC9E56C1D49}" type="datetimeFigureOut">
               <a:rPr lang="en-US" smtClean="0"/>
-              <a:t>2/6/2017</a:t>
+              <a:t>3/19/17</a:t>
             </a:fld>
             <a:endParaRPr lang="en-US"/>
           </a:p>
@@ -2876,7 +2876,7 @@
           <a:p>
             <a:fld id="{78C97017-6FC3-485B-9764-EAC9E56C1D49}" type="datetimeFigureOut">
               <a:rPr lang="en-US" smtClean="0"/>
-              <a:t>2/6/2017</a:t>
+              <a:t>3/19/17</a:t>
             </a:fld>
             <a:endParaRPr lang="en-US"/>
           </a:p>
@@ -3089,7 +3089,7 @@
           <a:p>
             <a:fld id="{78C97017-6FC3-485B-9764-EAC9E56C1D49}" type="datetimeFigureOut">
               <a:rPr lang="en-US" smtClean="0"/>
-              <a:t>2/6/2017</a:t>
+              <a:t>3/19/17</a:t>
             </a:fld>
             <a:endParaRPr lang="en-US"/>
           </a:p>
@@ -4691,7 +4691,15 @@
                   <a:srgbClr val="7030A0"/>
                 </a:solidFill>
               </a:rPr>
-              <a:t>deletePerson</a:t>
+              <a:t>delete</a:t>
+            </a:r>
+            <a:r>
+              <a:rPr lang="en-US" altLang="zh-CN" dirty="0" err="1" smtClean="0">
+                <a:solidFill>
+                  <a:srgbClr val="7030A0"/>
+                </a:solidFill>
+              </a:rPr>
+              <a:t>Task</a:t>
             </a:r>
             <a:r>
               <a:rPr lang="en-US" dirty="0" smtClean="0">
@@ -4699,7 +4707,15 @@
                   <a:srgbClr val="7030A0"/>
                 </a:solidFill>
               </a:rPr>
-              <a:t>(p)</a:t>
+              <a:t>(p</a:t>
+            </a:r>
+            <a:r>
+              <a:rPr lang="en-US" dirty="0" smtClean="0">
+                <a:solidFill>
+                  <a:srgbClr val="7030A0"/>
+                </a:solidFill>
+              </a:rPr>
+              <a:t>)</a:t>
             </a:r>
             <a:endParaRPr lang="en-US" dirty="0">
               <a:solidFill>

</xml_diff>

<commit_message>
Change back to old diagram DeleteTaskSdForLogic.png
</commit_message>
<xml_diff>
--- a/docs/diagrams/LogicComponentSequenceDiagram.pptx
+++ b/docs/diagrams/LogicComponentSequenceDiagram.pptx
@@ -3472,8 +3472,8 @@
         </p:nvSpPr>
         <p:spPr>
           <a:xfrm>
-            <a:off x="685800" y="1981200"/>
-            <a:ext cx="7252956" cy="4000286"/>
+            <a:off x="75101" y="1714857"/>
+            <a:ext cx="8538027" cy="4419600"/>
           </a:xfrm>
           <a:prstGeom prst="roundRect">
             <a:avLst>
@@ -3533,8 +3533,8 @@
         </p:nvSpPr>
         <p:spPr>
           <a:xfrm>
-            <a:off x="845045" y="2296546"/>
-            <a:ext cx="1455629" cy="346760"/>
+            <a:off x="879688" y="2314755"/>
+            <a:ext cx="1406312" cy="297808"/>
           </a:xfrm>
           <a:prstGeom prst="rect">
             <a:avLst/>
@@ -3600,8 +3600,8 @@
         </p:nvCxnSpPr>
         <p:spPr>
           <a:xfrm>
-            <a:off x="1572859" y="2660217"/>
-            <a:ext cx="0" cy="2597583"/>
+            <a:off x="1572859" y="2796614"/>
+            <a:ext cx="0" cy="2256087"/>
           </a:xfrm>
           <a:prstGeom prst="line">
             <a:avLst/>
@@ -3637,8 +3637,8 @@
         </p:nvSpPr>
         <p:spPr>
           <a:xfrm>
-            <a:off x="1500851" y="3010911"/>
-            <a:ext cx="152400" cy="2780287"/>
+            <a:off x="1504478" y="3156902"/>
+            <a:ext cx="132920" cy="2414771"/>
           </a:xfrm>
           <a:prstGeom prst="rect">
             <a:avLst/>
@@ -3684,8 +3684,8 @@
         </p:nvSpPr>
         <p:spPr>
           <a:xfrm>
-            <a:off x="2809782" y="2300233"/>
-            <a:ext cx="1093635" cy="346760"/>
+            <a:off x="2835809" y="2318441"/>
+            <a:ext cx="953846" cy="301173"/>
           </a:xfrm>
           <a:prstGeom prst="rect">
             <a:avLst/>
@@ -3743,8 +3743,8 @@
         </p:nvCxnSpPr>
         <p:spPr>
           <a:xfrm>
-            <a:off x="3356599" y="2663904"/>
-            <a:ext cx="0" cy="1695374"/>
+            <a:off x="3356599" y="2752927"/>
+            <a:ext cx="0" cy="1472488"/>
           </a:xfrm>
           <a:prstGeom prst="line">
             <a:avLst/>
@@ -3780,8 +3780,8 @@
         </p:nvSpPr>
         <p:spPr>
           <a:xfrm>
-            <a:off x="3284590" y="3122096"/>
-            <a:ext cx="174929" cy="1129459"/>
+            <a:off x="3288753" y="3181403"/>
+            <a:ext cx="152570" cy="980972"/>
           </a:xfrm>
           <a:prstGeom prst="rect">
             <a:avLst/>
@@ -3831,8 +3831,8 @@
         </p:nvSpPr>
         <p:spPr>
           <a:xfrm>
-            <a:off x="6221565" y="3312740"/>
-            <a:ext cx="1093635" cy="461538"/>
+            <a:off x="6247592" y="3336974"/>
+            <a:ext cx="1143808" cy="397747"/>
           </a:xfrm>
           <a:prstGeom prst="rect">
             <a:avLst/>
@@ -3915,8 +3915,8 @@
         </p:nvCxnSpPr>
         <p:spPr>
           <a:xfrm>
-            <a:off x="6772574" y="3774278"/>
-            <a:ext cx="0" cy="1940722"/>
+            <a:off x="6766461" y="3788771"/>
+            <a:ext cx="6113" cy="1926229"/>
           </a:xfrm>
           <a:prstGeom prst="line">
             <a:avLst/>
@@ -3952,8 +3952,8 @@
         </p:nvSpPr>
         <p:spPr>
           <a:xfrm>
-            <a:off x="6696374" y="3774278"/>
-            <a:ext cx="152400" cy="276003"/>
+            <a:off x="6700001" y="3788771"/>
+            <a:ext cx="132920" cy="239717"/>
           </a:xfrm>
           <a:prstGeom prst="rect">
             <a:avLst/>
@@ -3999,8 +3999,8 @@
         </p:nvCxnSpPr>
         <p:spPr>
           <a:xfrm>
-            <a:off x="381000" y="3014599"/>
-            <a:ext cx="1119851" cy="0"/>
+            <a:off x="407651" y="3014599"/>
+            <a:ext cx="976711" cy="0"/>
           </a:xfrm>
           <a:prstGeom prst="straightConnector1">
             <a:avLst/>
@@ -4034,9 +4034,9 @@
           <p:nvPr/>
         </p:nvCxnSpPr>
         <p:spPr>
-          <a:xfrm flipV="1">
-            <a:off x="1653251" y="3122097"/>
-            <a:ext cx="1596514" cy="1"/>
+          <a:xfrm>
+            <a:off x="1691245" y="3122098"/>
+            <a:ext cx="1392448" cy="1"/>
           </a:xfrm>
           <a:prstGeom prst="straightConnector1">
             <a:avLst/>
@@ -4071,8 +4071,8 @@
         </p:nvSpPr>
         <p:spPr>
           <a:xfrm>
-            <a:off x="0" y="2743200"/>
-            <a:ext cx="1424846" cy="215444"/>
+            <a:off x="33909" y="2767765"/>
+            <a:ext cx="1242722" cy="430887"/>
           </a:xfrm>
           <a:prstGeom prst="rect">
             <a:avLst/>
@@ -4109,9 +4109,9 @@
           <p:nvPr/>
         </p:nvCxnSpPr>
         <p:spPr>
-          <a:xfrm flipV="1">
-            <a:off x="5257218" y="3703214"/>
-            <a:ext cx="922392" cy="1"/>
+          <a:xfrm>
+            <a:off x="5279169" y="3703215"/>
+            <a:ext cx="804492" cy="1"/>
           </a:xfrm>
           <a:prstGeom prst="straightConnector1">
             <a:avLst/>
@@ -4146,8 +4146,8 @@
         </p:nvSpPr>
         <p:spPr>
           <a:xfrm>
-            <a:off x="4257582" y="4251556"/>
-            <a:ext cx="855809" cy="215444"/>
+            <a:off x="4277949" y="4263838"/>
+            <a:ext cx="746419" cy="215444"/>
           </a:xfrm>
           <a:prstGeom prst="rect">
             <a:avLst/>
@@ -4186,8 +4186,8 @@
         </p:nvCxnSpPr>
         <p:spPr>
           <a:xfrm>
-            <a:off x="5257800" y="4050281"/>
-            <a:ext cx="1492974" cy="0"/>
+            <a:off x="5293330" y="4050281"/>
+            <a:ext cx="1302142" cy="0"/>
           </a:xfrm>
           <a:prstGeom prst="straightConnector1">
             <a:avLst/>
@@ -4224,8 +4224,8 @@
         </p:nvCxnSpPr>
         <p:spPr>
           <a:xfrm flipV="1">
-            <a:off x="1670186" y="4243231"/>
-            <a:ext cx="1596514" cy="5378"/>
+            <a:off x="1708180" y="4248185"/>
+            <a:ext cx="1392448" cy="23"/>
           </a:xfrm>
           <a:prstGeom prst="straightConnector1">
             <a:avLst/>
@@ -4262,8 +4262,8 @@
         </p:nvCxnSpPr>
         <p:spPr>
           <a:xfrm>
-            <a:off x="304800" y="5791200"/>
-            <a:ext cx="1196051" cy="0"/>
+            <a:off x="333264" y="5791200"/>
+            <a:ext cx="1043172" cy="0"/>
           </a:xfrm>
           <a:prstGeom prst="straightConnector1">
             <a:avLst/>
@@ -4300,8 +4300,8 @@
         </p:nvSpPr>
         <p:spPr>
           <a:xfrm>
-            <a:off x="8265896" y="2362200"/>
-            <a:ext cx="1030504" cy="346760"/>
+            <a:off x="8626551" y="2394372"/>
+            <a:ext cx="898785" cy="301173"/>
           </a:xfrm>
           <a:prstGeom prst="rect">
             <a:avLst/>
@@ -4365,8 +4365,8 @@
         </p:nvCxnSpPr>
         <p:spPr>
           <a:xfrm>
-            <a:off x="1653251" y="4495317"/>
-            <a:ext cx="5043123" cy="0"/>
+            <a:off x="1773269" y="4495317"/>
+            <a:ext cx="4398511" cy="0"/>
           </a:xfrm>
           <a:prstGeom prst="straightConnector1">
             <a:avLst/>
@@ -4401,8 +4401,8 @@
         </p:nvSpPr>
         <p:spPr>
           <a:xfrm>
-            <a:off x="6687452" y="4467000"/>
-            <a:ext cx="161322" cy="1019400"/>
+            <a:off x="6691291" y="4520528"/>
+            <a:ext cx="140702" cy="885382"/>
           </a:xfrm>
           <a:prstGeom prst="rect">
             <a:avLst/>
@@ -4448,8 +4448,8 @@
         </p:nvCxnSpPr>
         <p:spPr>
           <a:xfrm>
-            <a:off x="8781148" y="2700858"/>
-            <a:ext cx="0" cy="2830598"/>
+            <a:off x="9081767" y="2710381"/>
+            <a:ext cx="0" cy="2458467"/>
           </a:xfrm>
           <a:prstGeom prst="line">
             <a:avLst/>
@@ -4488,8 +4488,8 @@
         </p:nvSpPr>
         <p:spPr>
           <a:xfrm>
-            <a:off x="8686800" y="4524597"/>
-            <a:ext cx="152400" cy="199803"/>
+            <a:off x="9001053" y="4442552"/>
+            <a:ext cx="132920" cy="173535"/>
           </a:xfrm>
           <a:prstGeom prst="rect">
             <a:avLst/>
@@ -4540,13 +4540,15 @@
       <p:cxnSp>
         <p:nvCxnSpPr>
           <p:cNvPr id="75" name="Straight Arrow Connector 74"/>
-          <p:cNvCxnSpPr/>
+          <p:cNvCxnSpPr>
+            <a:endCxn id="73" idx="1"/>
+          </p:cNvCxnSpPr>
           <p:nvPr/>
         </p:nvCxnSpPr>
         <p:spPr>
           <a:xfrm>
-            <a:off x="6850663" y="4524597"/>
-            <a:ext cx="1836137" cy="0"/>
+            <a:off x="6894360" y="4524597"/>
+            <a:ext cx="2106693" cy="4723"/>
           </a:xfrm>
           <a:prstGeom prst="straightConnector1">
             <a:avLst/>
@@ -4581,8 +4583,8 @@
         </p:nvCxnSpPr>
         <p:spPr>
           <a:xfrm flipV="1">
-            <a:off x="6848774" y="4714650"/>
-            <a:ext cx="1838026" cy="9750"/>
+            <a:off x="6892516" y="4723630"/>
+            <a:ext cx="1603090" cy="44"/>
           </a:xfrm>
           <a:prstGeom prst="straightConnector1">
             <a:avLst/>
@@ -4622,8 +4624,8 @@
         </p:nvCxnSpPr>
         <p:spPr>
           <a:xfrm>
-            <a:off x="1653251" y="5486400"/>
-            <a:ext cx="5052349" cy="0"/>
+            <a:off x="1773489" y="5486400"/>
+            <a:ext cx="4406558" cy="0"/>
           </a:xfrm>
           <a:prstGeom prst="straightConnector1">
             <a:avLst/>
@@ -4660,8 +4662,8 @@
         </p:nvSpPr>
         <p:spPr>
           <a:xfrm>
-            <a:off x="6984957" y="4267200"/>
-            <a:ext cx="1424846" cy="215444"/>
+            <a:off x="7018866" y="4279482"/>
+            <a:ext cx="1242722" cy="215444"/>
           </a:xfrm>
           <a:prstGeom prst="rect">
             <a:avLst/>
@@ -4707,15 +4709,7 @@
                   <a:srgbClr val="7030A0"/>
                 </a:solidFill>
               </a:rPr>
-              <a:t>(p</a:t>
-            </a:r>
-            <a:r>
-              <a:rPr lang="en-US" dirty="0" smtClean="0">
-                <a:solidFill>
-                  <a:srgbClr val="7030A0"/>
-                </a:solidFill>
-              </a:rPr>
-              <a:t>)</a:t>
+              <a:t>(p)</a:t>
             </a:r>
             <a:endParaRPr lang="en-US" dirty="0">
               <a:solidFill>
@@ -4733,8 +4727,8 @@
         </p:nvSpPr>
         <p:spPr>
           <a:xfrm>
-            <a:off x="3847551" y="3657600"/>
-            <a:ext cx="767033" cy="184666"/>
+            <a:off x="3865805" y="3668128"/>
+            <a:ext cx="668991" cy="184666"/>
           </a:xfrm>
           <a:prstGeom prst="rect">
             <a:avLst/>
@@ -4778,8 +4772,8 @@
         </p:nvSpPr>
         <p:spPr>
           <a:xfrm>
-            <a:off x="1742982" y="2850922"/>
-            <a:ext cx="1424846" cy="215444"/>
+            <a:off x="1776891" y="2863204"/>
+            <a:ext cx="1242722" cy="215444"/>
           </a:xfrm>
           <a:prstGeom prst="rect">
             <a:avLst/>
@@ -4819,8 +4813,8 @@
         </p:nvSpPr>
         <p:spPr>
           <a:xfrm>
-            <a:off x="4340137" y="5255323"/>
-            <a:ext cx="621216" cy="215444"/>
+            <a:off x="4354921" y="5267605"/>
+            <a:ext cx="541812" cy="215444"/>
           </a:xfrm>
           <a:prstGeom prst="rect">
             <a:avLst/>
@@ -4860,8 +4854,8 @@
         </p:nvSpPr>
         <p:spPr>
           <a:xfrm>
-            <a:off x="599983" y="5538488"/>
-            <a:ext cx="762000" cy="215444"/>
+            <a:off x="618117" y="5550770"/>
+            <a:ext cx="664602" cy="215444"/>
           </a:xfrm>
           <a:prstGeom prst="rect">
             <a:avLst/>
@@ -4901,8 +4895,8 @@
         </p:nvSpPr>
         <p:spPr>
           <a:xfrm>
-            <a:off x="7020246" y="4777286"/>
-            <a:ext cx="1590354" cy="461538"/>
+            <a:off x="7058094" y="4801520"/>
+            <a:ext cx="1568457" cy="446303"/>
           </a:xfrm>
           <a:prstGeom prst="rect">
             <a:avLst/>
@@ -4968,8 +4962,8 @@
         </p:nvSpPr>
         <p:spPr>
           <a:xfrm>
-            <a:off x="7777323" y="5238824"/>
-            <a:ext cx="152400" cy="171376"/>
+            <a:off x="7780950" y="5247823"/>
+            <a:ext cx="132920" cy="148846"/>
           </a:xfrm>
           <a:prstGeom prst="rect">
             <a:avLst/>
@@ -5015,8 +5009,8 @@
         </p:nvCxnSpPr>
         <p:spPr>
           <a:xfrm>
-            <a:off x="6858000" y="5410200"/>
-            <a:ext cx="966624" cy="0"/>
+            <a:off x="6881004" y="5410200"/>
+            <a:ext cx="843070" cy="0"/>
           </a:xfrm>
           <a:prstGeom prst="straightConnector1">
             <a:avLst/>
@@ -5053,8 +5047,8 @@
         </p:nvSpPr>
         <p:spPr>
           <a:xfrm>
-            <a:off x="2673845" y="4027787"/>
-            <a:ext cx="220343" cy="215444"/>
+            <a:off x="2679089" y="4040069"/>
+            <a:ext cx="192179" cy="215444"/>
           </a:xfrm>
           <a:prstGeom prst="rect">
             <a:avLst/>
@@ -5094,8 +5088,8 @@
         </p:nvSpPr>
         <p:spPr>
           <a:xfrm>
-            <a:off x="4231981" y="2929839"/>
-            <a:ext cx="1778201" cy="432035"/>
+            <a:off x="4274300" y="2952526"/>
+            <a:ext cx="1650344" cy="390706"/>
           </a:xfrm>
           <a:prstGeom prst="rect">
             <a:avLst/>
@@ -5177,8 +5171,8 @@
         </p:nvCxnSpPr>
         <p:spPr>
           <a:xfrm>
-            <a:off x="3462591" y="3657600"/>
-            <a:ext cx="1597356" cy="1"/>
+            <a:off x="3500606" y="3657600"/>
+            <a:ext cx="1393182" cy="1"/>
           </a:xfrm>
           <a:prstGeom prst="straightConnector1">
             <a:avLst/>
@@ -5211,8 +5205,8 @@
         </p:nvSpPr>
         <p:spPr>
           <a:xfrm>
-            <a:off x="5059947" y="3352800"/>
-            <a:ext cx="205843" cy="123165"/>
+            <a:off x="5064846" y="3359267"/>
+            <a:ext cx="179532" cy="106973"/>
           </a:xfrm>
           <a:prstGeom prst="rect">
             <a:avLst/>
@@ -5260,8 +5254,8 @@
         </p:nvCxnSpPr>
         <p:spPr>
           <a:xfrm>
-            <a:off x="5162869" y="3352800"/>
-            <a:ext cx="0" cy="990600"/>
+            <a:off x="5154612" y="3359267"/>
+            <a:ext cx="8257" cy="984133"/>
           </a:xfrm>
           <a:prstGeom prst="line">
             <a:avLst/>
@@ -5297,8 +5291,8 @@
         </p:nvSpPr>
         <p:spPr>
           <a:xfrm>
-            <a:off x="5059947" y="3657601"/>
-            <a:ext cx="205843" cy="533400"/>
+            <a:off x="5064846" y="3685609"/>
+            <a:ext cx="179532" cy="463276"/>
           </a:xfrm>
           <a:prstGeom prst="rect">
             <a:avLst/>
@@ -5344,8 +5338,8 @@
         </p:nvCxnSpPr>
         <p:spPr>
           <a:xfrm>
-            <a:off x="3499382" y="4185073"/>
-            <a:ext cx="1667219" cy="0"/>
+            <a:off x="3539059" y="4185073"/>
+            <a:ext cx="1454115" cy="0"/>
           </a:xfrm>
           <a:prstGeom prst="straightConnector1">
             <a:avLst/>
@@ -5382,8 +5376,8 @@
         </p:nvCxnSpPr>
         <p:spPr>
           <a:xfrm>
-            <a:off x="6858000" y="5029200"/>
-            <a:ext cx="162246" cy="0"/>
+            <a:off x="6861861" y="5029200"/>
+            <a:ext cx="141508" cy="0"/>
           </a:xfrm>
           <a:prstGeom prst="straightConnector1">
             <a:avLst/>
@@ -5416,8 +5410,8 @@
         </p:nvCxnSpPr>
         <p:spPr>
           <a:xfrm>
-            <a:off x="3412425" y="3173004"/>
-            <a:ext cx="819556" cy="1"/>
+            <a:off x="3431929" y="3173004"/>
+            <a:ext cx="714800" cy="1"/>
           </a:xfrm>
           <a:prstGeom prst="straightConnector1">
             <a:avLst/>
@@ -5452,8 +5446,8 @@
         </p:nvCxnSpPr>
         <p:spPr>
           <a:xfrm>
-            <a:off x="3459519" y="3475965"/>
-            <a:ext cx="1600428" cy="0"/>
+            <a:off x="3497607" y="3475965"/>
+            <a:ext cx="1395861" cy="0"/>
           </a:xfrm>
           <a:prstGeom prst="straightConnector1">
             <a:avLst/>
@@ -5490,8 +5484,8 @@
         </p:nvSpPr>
         <p:spPr>
           <a:xfrm>
-            <a:off x="5033665" y="4199590"/>
-            <a:ext cx="258404" cy="261610"/>
+            <a:off x="5039815" y="4214504"/>
+            <a:ext cx="225374" cy="261610"/>
           </a:xfrm>
           <a:prstGeom prst="rect">
             <a:avLst/>
@@ -5499,7 +5493,7 @@
           <a:noFill/>
         </p:spPr>
         <p:txBody>
-          <a:bodyPr wrap="none" rtlCol="0">
+          <a:bodyPr wrap="square" rtlCol="0">
             <a:spAutoFit/>
           </a:bodyPr>
           <a:lstStyle/>

</xml_diff>